<commit_message>
Update names and features
</commit_message>
<xml_diff>
--- a/docs/Vibhaag - First Presentation.pptx
+++ b/docs/Vibhaag - First Presentation.pptx
@@ -263,7 +263,7 @@
           <a:p>
             <a:fld id="{719A5B7C-5BE9-41C6-A253-E2FED6DD576B}" type="datetimeFigureOut">
               <a:rPr lang="en-US" smtClean="0"/>
-              <a:t>1/27/2019</a:t>
+              <a:t>1/28/2019</a:t>
             </a:fld>
             <a:endParaRPr lang="en-US"/>
           </a:p>
@@ -461,7 +461,7 @@
           <a:p>
             <a:fld id="{719A5B7C-5BE9-41C6-A253-E2FED6DD576B}" type="datetimeFigureOut">
               <a:rPr lang="en-US" smtClean="0"/>
-              <a:t>1/27/2019</a:t>
+              <a:t>1/28/2019</a:t>
             </a:fld>
             <a:endParaRPr lang="en-US"/>
           </a:p>
@@ -669,7 +669,7 @@
           <a:p>
             <a:fld id="{719A5B7C-5BE9-41C6-A253-E2FED6DD576B}" type="datetimeFigureOut">
               <a:rPr lang="en-US" smtClean="0"/>
-              <a:t>1/27/2019</a:t>
+              <a:t>1/28/2019</a:t>
             </a:fld>
             <a:endParaRPr lang="en-US"/>
           </a:p>
@@ -867,7 +867,7 @@
           <a:p>
             <a:fld id="{719A5B7C-5BE9-41C6-A253-E2FED6DD576B}" type="datetimeFigureOut">
               <a:rPr lang="en-US" smtClean="0"/>
-              <a:t>1/27/2019</a:t>
+              <a:t>1/28/2019</a:t>
             </a:fld>
             <a:endParaRPr lang="en-US"/>
           </a:p>
@@ -1142,7 +1142,7 @@
           <a:p>
             <a:fld id="{719A5B7C-5BE9-41C6-A253-E2FED6DD576B}" type="datetimeFigureOut">
               <a:rPr lang="en-US" smtClean="0"/>
-              <a:t>1/27/2019</a:t>
+              <a:t>1/28/2019</a:t>
             </a:fld>
             <a:endParaRPr lang="en-US"/>
           </a:p>
@@ -1407,7 +1407,7 @@
           <a:p>
             <a:fld id="{719A5B7C-5BE9-41C6-A253-E2FED6DD576B}" type="datetimeFigureOut">
               <a:rPr lang="en-US" smtClean="0"/>
-              <a:t>1/27/2019</a:t>
+              <a:t>1/28/2019</a:t>
             </a:fld>
             <a:endParaRPr lang="en-US"/>
           </a:p>
@@ -1819,7 +1819,7 @@
           <a:p>
             <a:fld id="{719A5B7C-5BE9-41C6-A253-E2FED6DD576B}" type="datetimeFigureOut">
               <a:rPr lang="en-US" smtClean="0"/>
-              <a:t>1/27/2019</a:t>
+              <a:t>1/28/2019</a:t>
             </a:fld>
             <a:endParaRPr lang="en-US"/>
           </a:p>
@@ -1960,7 +1960,7 @@
           <a:p>
             <a:fld id="{719A5B7C-5BE9-41C6-A253-E2FED6DD576B}" type="datetimeFigureOut">
               <a:rPr lang="en-US" smtClean="0"/>
-              <a:t>1/27/2019</a:t>
+              <a:t>1/28/2019</a:t>
             </a:fld>
             <a:endParaRPr lang="en-US"/>
           </a:p>
@@ -2073,7 +2073,7 @@
           <a:p>
             <a:fld id="{719A5B7C-5BE9-41C6-A253-E2FED6DD576B}" type="datetimeFigureOut">
               <a:rPr lang="en-US" smtClean="0"/>
-              <a:t>1/27/2019</a:t>
+              <a:t>1/28/2019</a:t>
             </a:fld>
             <a:endParaRPr lang="en-US"/>
           </a:p>
@@ -2384,7 +2384,7 @@
           <a:p>
             <a:fld id="{719A5B7C-5BE9-41C6-A253-E2FED6DD576B}" type="datetimeFigureOut">
               <a:rPr lang="en-US" smtClean="0"/>
-              <a:t>1/27/2019</a:t>
+              <a:t>1/28/2019</a:t>
             </a:fld>
             <a:endParaRPr lang="en-US"/>
           </a:p>
@@ -2672,7 +2672,7 @@
           <a:p>
             <a:fld id="{719A5B7C-5BE9-41C6-A253-E2FED6DD576B}" type="datetimeFigureOut">
               <a:rPr lang="en-US" smtClean="0"/>
-              <a:t>1/27/2019</a:t>
+              <a:t>1/28/2019</a:t>
             </a:fld>
             <a:endParaRPr lang="en-US"/>
           </a:p>
@@ -2913,7 +2913,7 @@
           <a:p>
             <a:fld id="{719A5B7C-5BE9-41C6-A253-E2FED6DD576B}" type="datetimeFigureOut">
               <a:rPr lang="en-US" smtClean="0"/>
-              <a:t>1/27/2019</a:t>
+              <a:t>1/28/2019</a:t>
             </a:fld>
             <a:endParaRPr lang="en-US"/>
           </a:p>
@@ -3385,11 +3385,159 @@
           <a:p>
             <a:r>
               <a:rPr lang="en-US" dirty="0"/>
-              <a:t>A college analytics, session monitoring and management tool</a:t>
+              <a:t>A college analytics, session monitoring and </a:t>
+            </a:r>
+          </a:p>
+          <a:p>
+            <a:r>
+              <a:rPr lang="en-US" dirty="0"/>
+              <a:t>management tool</a:t>
             </a:r>
           </a:p>
           <a:p>
             <a:endParaRPr lang="en-US" dirty="0"/>
+          </a:p>
+        </p:txBody>
+      </p:sp>
+      <p:sp>
+        <p:nvSpPr>
+          <p:cNvPr id="4" name="TextBox 3">
+            <a:extLst>
+              <a:ext uri="{FF2B5EF4-FFF2-40B4-BE49-F238E27FC236}">
+                <a16:creationId xmlns:a16="http://schemas.microsoft.com/office/drawing/2014/main" id="{DBA5E7E3-35E9-48E0-B25D-4CBE66173EE4}"/>
+              </a:ext>
+            </a:extLst>
+          </p:cNvPr>
+          <p:cNvSpPr txBox="1"/>
+          <p:nvPr/>
+        </p:nvSpPr>
+        <p:spPr>
+          <a:xfrm>
+            <a:off x="438539" y="4609322"/>
+            <a:ext cx="3135085" cy="1754326"/>
+          </a:xfrm>
+          <a:prstGeom prst="rect">
+            <a:avLst/>
+          </a:prstGeom>
+          <a:noFill/>
+        </p:spPr>
+        <p:txBody>
+          <a:bodyPr wrap="square" rtlCol="0">
+            <a:spAutoFit/>
+          </a:bodyPr>
+          <a:lstStyle/>
+          <a:p>
+            <a:r>
+              <a:rPr lang="en-US" b="1" dirty="0"/>
+              <a:t>Guide:</a:t>
+            </a:r>
+          </a:p>
+          <a:p>
+            <a:endParaRPr lang="en-US" dirty="0"/>
+          </a:p>
+          <a:p>
+            <a:r>
+              <a:rPr lang="en-US" dirty="0"/>
+              <a:t>Dr Veena S,</a:t>
+            </a:r>
+          </a:p>
+          <a:p>
+            <a:r>
+              <a:rPr lang="en-US" dirty="0"/>
+              <a:t>Chairperson,</a:t>
+            </a:r>
+          </a:p>
+          <a:p>
+            <a:r>
+              <a:rPr lang="en-US" dirty="0"/>
+              <a:t>Department of Computer</a:t>
+            </a:r>
+          </a:p>
+          <a:p>
+            <a:r>
+              <a:rPr lang="en-US" dirty="0"/>
+              <a:t>Applications</a:t>
+            </a:r>
+          </a:p>
+        </p:txBody>
+      </p:sp>
+      <p:sp>
+        <p:nvSpPr>
+          <p:cNvPr id="5" name="TextBox 4">
+            <a:extLst>
+              <a:ext uri="{FF2B5EF4-FFF2-40B4-BE49-F238E27FC236}">
+                <a16:creationId xmlns:a16="http://schemas.microsoft.com/office/drawing/2014/main" id="{D19F3BFA-D992-4424-A546-11B01BC9410C}"/>
+              </a:ext>
+            </a:extLst>
+          </p:cNvPr>
+          <p:cNvSpPr txBox="1"/>
+          <p:nvPr/>
+        </p:nvSpPr>
+        <p:spPr>
+          <a:xfrm>
+            <a:off x="9535889" y="4057213"/>
+            <a:ext cx="2939144" cy="2616101"/>
+          </a:xfrm>
+          <a:prstGeom prst="rect">
+            <a:avLst/>
+          </a:prstGeom>
+          <a:noFill/>
+        </p:spPr>
+        <p:txBody>
+          <a:bodyPr wrap="square" rtlCol="0">
+            <a:spAutoFit/>
+          </a:bodyPr>
+          <a:lstStyle/>
+          <a:p>
+            <a:r>
+              <a:rPr lang="en-US" sz="1600" b="1" dirty="0"/>
+              <a:t>By,</a:t>
+            </a:r>
+          </a:p>
+          <a:p>
+            <a:endParaRPr lang="en-US" sz="1600" dirty="0"/>
+          </a:p>
+          <a:p>
+            <a:r>
+              <a:rPr lang="en-US" sz="1600" dirty="0"/>
+              <a:t>Sudhanva N</a:t>
+            </a:r>
+          </a:p>
+          <a:p>
+            <a:r>
+              <a:rPr lang="en-US" sz="1600" dirty="0"/>
+              <a:t>PES1201702260</a:t>
+            </a:r>
+          </a:p>
+          <a:p>
+            <a:endParaRPr lang="en-US" sz="1600" dirty="0"/>
+          </a:p>
+          <a:p>
+            <a:r>
+              <a:rPr lang="en-US" sz="1600" dirty="0"/>
+              <a:t>Karthik D</a:t>
+            </a:r>
+          </a:p>
+          <a:p>
+            <a:r>
+              <a:rPr lang="en-US" sz="1600" dirty="0"/>
+              <a:t>PES1201702449</a:t>
+            </a:r>
+          </a:p>
+          <a:p>
+            <a:endParaRPr lang="en-US" sz="1600" dirty="0"/>
+          </a:p>
+          <a:p>
+            <a:r>
+              <a:rPr lang="en-US" sz="1600" dirty="0"/>
+              <a:t>Harsha K Y</a:t>
+            </a:r>
+          </a:p>
+          <a:p>
+            <a:r>
+              <a:rPr lang="en-US" sz="1600" dirty="0"/>
+              <a:t>PES1201801839</a:t>
+            </a:r>
           </a:p>
         </p:txBody>
       </p:sp>
@@ -3487,7 +3635,7 @@
         <p:spPr>
           <a:xfrm>
             <a:off x="2706655" y="628263"/>
-            <a:ext cx="8402210" cy="5601473"/>
+            <a:ext cx="8402209" cy="5601473"/>
           </a:xfrm>
           <a:prstGeom prst="rect">
             <a:avLst/>

</xml_diff>